<commit_message>
Aggiunta analisi modello motore
</commit_message>
<xml_diff>
--- a/00_Relazione/Meccanica Delle Vibrazioni presentazione.pptx
+++ b/00_Relazione/Meccanica Delle Vibrazioni presentazione.pptx
@@ -235,7 +235,7 @@
             <a:pPr rtl="0"/>
             <a:fld id="{23AEF8A9-CFB5-40C0-BAE2-5B4633EC9F63}" type="datetime1">
               <a:rPr lang="it-IT" smtClean="0"/>
-              <a:t>10/01/2020</a:t>
+              <a:t>15/01/2020</a:t>
             </a:fld>
             <a:endParaRPr lang="it-IT" dirty="0"/>
           </a:p>
@@ -412,7 +412,7 @@
             <a:fld id="{09F431D3-F76B-41A6-8072-4F6D884C46F8}" type="datetime1">
               <a:rPr lang="it-IT" smtClean="0"/>
               <a:pPr/>
-              <a:t>10/01/2020</a:t>
+              <a:t>15/01/2020</a:t>
             </a:fld>
             <a:endParaRPr lang="it-IT" dirty="0"/>
           </a:p>
@@ -1868,7 +1868,7 @@
             <a:fld id="{982DBDC9-B003-41F0-B8B2-2F0AA2C1B651}" type="datetime1">
               <a:rPr lang="it-IT" smtClean="0"/>
               <a:pPr/>
-              <a:t>10/01/2020</a:t>
+              <a:t>15/01/2020</a:t>
             </a:fld>
             <a:endParaRPr lang="it-IT" dirty="0"/>
           </a:p>
@@ -2099,7 +2099,7 @@
             <a:fld id="{07E64E86-02CD-4AD8-8F6E-73FB87F29031}" type="datetime1">
               <a:rPr lang="it-IT" smtClean="0"/>
               <a:pPr/>
-              <a:t>10/01/2020</a:t>
+              <a:t>15/01/2020</a:t>
             </a:fld>
             <a:endParaRPr lang="it-IT" dirty="0"/>
           </a:p>
@@ -2925,7 +2925,7 @@
             <a:fld id="{56884175-B988-418C-8366-CD8114C73802}" type="datetime1">
               <a:rPr lang="it-IT" smtClean="0"/>
               <a:pPr/>
-              <a:t>10/01/2020</a:t>
+              <a:t>15/01/2020</a:t>
             </a:fld>
             <a:endParaRPr lang="it-IT" dirty="0"/>
           </a:p>
@@ -3134,7 +3134,7 @@
             <a:fld id="{07EF584B-7CE1-48A1-AB7A-1EEAB5F615CD}" type="datetime1">
               <a:rPr lang="it-IT" smtClean="0"/>
               <a:pPr/>
-              <a:t>10/01/2020</a:t>
+              <a:t>15/01/2020</a:t>
             </a:fld>
             <a:endParaRPr lang="it-IT" dirty="0"/>
           </a:p>
@@ -4403,7 +4403,7 @@
             <a:fld id="{2F956552-D53A-4557-8C38-42CBEA2EE1F9}" type="datetime1">
               <a:rPr lang="it-IT" smtClean="0"/>
               <a:pPr/>
-              <a:t>10/01/2020</a:t>
+              <a:t>15/01/2020</a:t>
             </a:fld>
             <a:endParaRPr lang="it-IT" dirty="0"/>
           </a:p>
@@ -4736,7 +4736,7 @@
             <a:fld id="{F68A04E6-3A63-4A5D-901F-B7E0EE19AFD7}" type="datetime1">
               <a:rPr lang="it-IT" smtClean="0"/>
               <a:pPr/>
-              <a:t>10/01/2020</a:t>
+              <a:t>15/01/2020</a:t>
             </a:fld>
             <a:endParaRPr lang="it-IT" dirty="0"/>
           </a:p>
@@ -5195,7 +5195,7 @@
             <a:fld id="{E89D5404-FB42-4B9E-BE7A-7821366B0BBC}" type="datetime1">
               <a:rPr lang="it-IT" smtClean="0"/>
               <a:pPr/>
-              <a:t>10/01/2020</a:t>
+              <a:t>15/01/2020</a:t>
             </a:fld>
             <a:endParaRPr lang="it-IT" dirty="0"/>
           </a:p>
@@ -5336,7 +5336,7 @@
             <a:fld id="{DA63B92F-6927-4909-8675-8FB028AE3CD8}" type="datetime1">
               <a:rPr lang="it-IT" smtClean="0"/>
               <a:pPr/>
-              <a:t>10/01/2020</a:t>
+              <a:t>15/01/2020</a:t>
             </a:fld>
             <a:endParaRPr lang="it-IT" dirty="0"/>
           </a:p>
@@ -5681,7 +5681,7 @@
             <a:fld id="{ACB5D043-5A31-4D67-9FB4-6681AB6A05C6}" type="datetime1">
               <a:rPr lang="it-IT" smtClean="0"/>
               <a:pPr/>
-              <a:t>10/01/2020</a:t>
+              <a:t>15/01/2020</a:t>
             </a:fld>
             <a:endParaRPr lang="it-IT" dirty="0"/>
           </a:p>
@@ -6184,7 +6184,7 @@
             <a:fld id="{7B44B99B-722F-4DC5-AC4D-948C49352303}" type="datetime1">
               <a:rPr lang="it-IT" smtClean="0"/>
               <a:pPr/>
-              <a:t>10/01/2020</a:t>
+              <a:t>15/01/2020</a:t>
             </a:fld>
             <a:endParaRPr lang="it-IT" dirty="0"/>
           </a:p>
@@ -6640,7 +6640,7 @@
             <a:fld id="{239C2E7C-B484-43C6-BE81-E8A28A90F8D9}" type="datetime1">
               <a:rPr lang="it-IT" smtClean="0"/>
               <a:pPr/>
-              <a:t>10/01/2020</a:t>
+              <a:t>15/01/2020</a:t>
             </a:fld>
             <a:endParaRPr lang="it-IT" dirty="0"/>
           </a:p>
@@ -7543,7 +7543,7 @@
             <a:fld id="{62DE71F0-C68A-46D7-94E0-C7A236B6AC63}" type="datetime1">
               <a:rPr lang="it-IT" smtClean="0"/>
               <a:pPr/>
-              <a:t>10/01/2020</a:t>
+              <a:t>15/01/2020</a:t>
             </a:fld>
             <a:endParaRPr lang="it-IT" dirty="0"/>
           </a:p>
@@ -8014,13 +8014,8 @@
             </a:r>
             <a:r>
               <a:rPr lang="it-IT" dirty="0"/>
-              <a:t> </a:t>
-            </a:r>
-            <a:r>
-              <a:rPr lang="it-IT" dirty="0" err="1"/>
-              <a:t>Controll</a:t>
-            </a:r>
-            <a:endParaRPr lang="it-IT" dirty="0"/>
+              <a:t> Control</a:t>
+            </a:r>
           </a:p>
         </p:txBody>
       </p:sp>
@@ -8184,20 +8179,20 @@
           </a:p>
           <a:p>
             <a:r>
-              <a:rPr lang="it-IT" dirty="0"/>
+              <a:rPr lang="it-IT" b="1" i="1" dirty="0"/>
               <a:t>Simulazione Matlab</a:t>
             </a:r>
           </a:p>
           <a:p>
             <a:pPr rtl="0"/>
             <a:r>
-              <a:rPr lang="it-IT" dirty="0"/>
+              <a:rPr lang="it-IT" b="1" i="1" dirty="0"/>
               <a:t>Modello di Controllo</a:t>
             </a:r>
           </a:p>
           <a:p>
             <a:r>
-              <a:rPr lang="it-IT" dirty="0"/>
+              <a:rPr lang="it-IT" u="sng" dirty="0"/>
               <a:t>Modello e identificazione di un motore DC</a:t>
             </a:r>
           </a:p>
@@ -8211,13 +8206,8 @@
             <a:pPr lvl="1"/>
             <a:r>
               <a:rPr lang="it-IT" dirty="0"/>
-              <a:t>Encoder, Accelerometro, </a:t>
-            </a:r>
-            <a:r>
-              <a:rPr lang="it-IT" dirty="0" err="1"/>
-              <a:t>Gyroscopio</a:t>
-            </a:r>
-            <a:endParaRPr lang="it-IT" dirty="0"/>
+              <a:t>Encoder, Accelerometro, Giroscopio</a:t>
+            </a:r>
           </a:p>
           <a:p>
             <a:r>

</xml_diff>